<commit_message>
Update Atividade de controle de versoes.pptx
minha atualizacao
</commit_message>
<xml_diff>
--- a/Atividade de controle de versoes.pptx
+++ b/Atividade de controle de versoes.pptx
@@ -279,7 +279,7 @@
             <a:fld id="{08B9EBBA-996F-894A-B54A-D6246ED52CEA}" type="datetimeFigureOut">
               <a:rPr lang="en-US" smtClean="0"/>
               <a:pPr/>
-              <a:t>3/31/2021</a:t>
+              <a:t>4/5/2021</a:t>
             </a:fld>
             <a:endParaRPr lang="en-US" dirty="0"/>
           </a:p>
@@ -451,7 +451,7 @@
             <a:fld id="{C6C52C72-DE31-F449-A4ED-4C594FD91407}" type="datetimeFigureOut">
               <a:rPr lang="en-US" smtClean="0"/>
               <a:pPr/>
-              <a:t>3/31/2021</a:t>
+              <a:t>4/5/2021</a:t>
             </a:fld>
             <a:endParaRPr lang="en-US" dirty="0"/>
           </a:p>
@@ -633,7 +633,7 @@
             <a:fld id="{ED62726E-379B-B349-9EED-81ED093FA806}" type="datetimeFigureOut">
               <a:rPr lang="en-US" smtClean="0"/>
               <a:pPr/>
-              <a:t>3/31/2021</a:t>
+              <a:t>4/5/2021</a:t>
             </a:fld>
             <a:endParaRPr lang="en-US" dirty="0"/>
           </a:p>
@@ -805,7 +805,7 @@
             <a:fld id="{9B3A1323-8D79-1946-B0D7-40001CF92E9D}" type="datetimeFigureOut">
               <a:rPr lang="en-US" smtClean="0"/>
               <a:pPr/>
-              <a:t>3/31/2021</a:t>
+              <a:t>4/5/2021</a:t>
             </a:fld>
             <a:endParaRPr lang="en-US" dirty="0"/>
           </a:p>
@@ -1075,7 +1075,7 @@
             <a:fld id="{8DFA1846-DA80-1C48-A609-854EA85C59AD}" type="datetimeFigureOut">
               <a:rPr lang="en-US" smtClean="0"/>
               <a:pPr/>
-              <a:t>3/31/2021</a:t>
+              <a:t>4/5/2021</a:t>
             </a:fld>
             <a:endParaRPr lang="en-US" dirty="0"/>
           </a:p>
@@ -1309,7 +1309,7 @@
             <a:fld id="{57302355-E14B-8545-A8F8-0FE83CC9D524}" type="datetimeFigureOut">
               <a:rPr lang="en-US" smtClean="0"/>
               <a:pPr/>
-              <a:t>3/31/2021</a:t>
+              <a:t>4/5/2021</a:t>
             </a:fld>
             <a:endParaRPr lang="en-US" dirty="0"/>
           </a:p>
@@ -1670,7 +1670,7 @@
             <a:fld id="{09B482E8-6E0E-1B4F-B1FD-C69DB9E858D9}" type="datetimeFigureOut">
               <a:rPr lang="en-US" smtClean="0"/>
               <a:pPr/>
-              <a:t>3/31/2021</a:t>
+              <a:t>4/5/2021</a:t>
             </a:fld>
             <a:endParaRPr lang="en-US" dirty="0"/>
           </a:p>
@@ -1814,7 +1814,7 @@
             <a:fld id="{F13A34C8-038E-2045-AF43-DF7DBB8E0E9E}" type="datetimeFigureOut">
               <a:rPr lang="en-US" smtClean="0"/>
               <a:pPr/>
-              <a:t>3/31/2021</a:t>
+              <a:t>4/5/2021</a:t>
             </a:fld>
             <a:endParaRPr lang="en-US" dirty="0"/>
           </a:p>
@@ -1911,7 +1911,7 @@
             <a:fld id="{8818C68F-D26B-8F47-958C-23B49CF8A634}" type="datetimeFigureOut">
               <a:rPr lang="en-US" smtClean="0"/>
               <a:pPr/>
-              <a:t>3/31/2021</a:t>
+              <a:t>4/5/2021</a:t>
             </a:fld>
             <a:endParaRPr lang="en-US" dirty="0"/>
           </a:p>
@@ -2270,7 +2270,7 @@
             <a:fld id="{D0DF5E60-9974-AC48-9591-99C2BB44B7CF}" type="datetimeFigureOut">
               <a:rPr lang="en-US" smtClean="0"/>
               <a:pPr/>
-              <a:t>3/31/2021</a:t>
+              <a:t>4/5/2021</a:t>
             </a:fld>
             <a:endParaRPr lang="en-US" dirty="0"/>
           </a:p>
@@ -2631,7 +2631,7 @@
             <a:fld id="{09B482E8-6E0E-1B4F-B1FD-C69DB9E858D9}" type="datetimeFigureOut">
               <a:rPr lang="en-US" smtClean="0"/>
               <a:pPr/>
-              <a:t>3/31/2021</a:t>
+              <a:t>4/5/2021</a:t>
             </a:fld>
             <a:endParaRPr lang="en-US" dirty="0"/>
           </a:p>
@@ -2878,7 +2878,7 @@
             <a:fld id="{09B482E8-6E0E-1B4F-B1FD-C69DB9E858D9}" type="datetimeFigureOut">
               <a:rPr lang="en-US" smtClean="0"/>
               <a:pPr/>
-              <a:t>3/31/2021</a:t>
+              <a:t>4/5/2021</a:t>
             </a:fld>
             <a:endParaRPr lang="en-US" dirty="0"/>
           </a:p>
@@ -3351,7 +3351,7 @@
           <p:cNvPr id="4" name="Title 1">
             <a:extLst>
               <a:ext uri="{FF2B5EF4-FFF2-40B4-BE49-F238E27FC236}">
-                <a16:creationId xmlns:a16="http://schemas.microsoft.com/office/drawing/2014/main" xmlns="" id="{854162F5-84C3-E248-B56A-B760B2963C40}"/>
+                <a16:creationId xmlns:a16="http://schemas.microsoft.com/office/drawing/2014/main" id="{854162F5-84C3-E248-B56A-B760B2963C40}"/>
               </a:ext>
             </a:extLst>
           </p:cNvPr>
@@ -3454,7 +3454,7 @@
           <p:cNvPr id="2" name="Title 1">
             <a:extLst>
               <a:ext uri="{FF2B5EF4-FFF2-40B4-BE49-F238E27FC236}">
-                <a16:creationId xmlns:a16="http://schemas.microsoft.com/office/drawing/2014/main" xmlns="" id="{73FD4F77-028A-7A47-BC41-2C419FC56E27}"/>
+                <a16:creationId xmlns:a16="http://schemas.microsoft.com/office/drawing/2014/main" id="{73FD4F77-028A-7A47-BC41-2C419FC56E27}"/>
               </a:ext>
             </a:extLst>
           </p:cNvPr>
@@ -3488,7 +3488,7 @@
           <p:cNvPr id="1026" name="Picture 2" descr="Git na prática — Parte 1 (Subindo projeto para o github).">
             <a:extLst>
               <a:ext uri="{FF2B5EF4-FFF2-40B4-BE49-F238E27FC236}">
-                <a16:creationId xmlns:a16="http://schemas.microsoft.com/office/drawing/2014/main" xmlns="" id="{C41C7762-29AF-DE4A-8B75-0AA40134A4CA}"/>
+                <a16:creationId xmlns:a16="http://schemas.microsoft.com/office/drawing/2014/main" id="{C41C7762-29AF-DE4A-8B75-0AA40134A4CA}"/>
               </a:ext>
             </a:extLst>
           </p:cNvPr>
@@ -3565,7 +3565,7 @@
           <p:cNvPr id="6" name="TextBox 5">
             <a:extLst>
               <a:ext uri="{FF2B5EF4-FFF2-40B4-BE49-F238E27FC236}">
-                <a16:creationId xmlns:a16="http://schemas.microsoft.com/office/drawing/2014/main" xmlns="" id="{D5751BA7-3065-D045-A3E0-72C84756D1B7}"/>
+                <a16:creationId xmlns:a16="http://schemas.microsoft.com/office/drawing/2014/main" id="{D5751BA7-3065-D045-A3E0-72C84756D1B7}"/>
               </a:ext>
             </a:extLst>
           </p:cNvPr>
@@ -3595,8 +3595,13 @@
             </a:pPr>
             <a:r>
               <a:rPr lang="pt-BR" sz="3200" dirty="0" smtClean="0"/>
-              <a:t>Nome: Paulo Alexandre S. c. da Fonseca</a:t>
-            </a:r>
+              <a:t>Nome: </a:t>
+            </a:r>
+            <a:r>
+              <a:rPr lang="pt-BR" sz="3200" dirty="0" smtClean="0"/>
+              <a:t>Paulo Alexandre S. c. da Fonseca</a:t>
+            </a:r>
+            <a:endParaRPr lang="pt-BR" sz="3200" dirty="0" smtClean="0"/>
           </a:p>
           <a:p>
             <a:pPr algn="just">
@@ -3740,7 +3745,7 @@
           <p:cNvPr id="6" name="TextBox 5">
             <a:extLst>
               <a:ext uri="{FF2B5EF4-FFF2-40B4-BE49-F238E27FC236}">
-                <a16:creationId xmlns:a16="http://schemas.microsoft.com/office/drawing/2014/main" xmlns="" id="{D5751BA7-3065-D045-A3E0-72C84756D1B7}"/>
+                <a16:creationId xmlns:a16="http://schemas.microsoft.com/office/drawing/2014/main" id="{D5751BA7-3065-D045-A3E0-72C84756D1B7}"/>
               </a:ext>
             </a:extLst>
           </p:cNvPr>
@@ -3750,7 +3755,7 @@
         <p:spPr>
           <a:xfrm>
             <a:off x="437882" y="1490680"/>
-            <a:ext cx="8401317" cy="4031873"/>
+            <a:ext cx="8401317" cy="5016758"/>
           </a:xfrm>
           <a:prstGeom prst="rect">
             <a:avLst/>
@@ -3770,8 +3775,13 @@
             </a:pPr>
             <a:r>
               <a:rPr lang="pt-BR" sz="3200" dirty="0" smtClean="0"/>
-              <a:t>Nome:</a:t>
-            </a:r>
+              <a:t>Nome</a:t>
+            </a:r>
+            <a:r>
+              <a:rPr lang="pt-BR" sz="3200" dirty="0" smtClean="0"/>
+              <a:t>: Francisco Bastos</a:t>
+            </a:r>
+            <a:endParaRPr lang="pt-BR" sz="3200" dirty="0" smtClean="0"/>
           </a:p>
           <a:p>
             <a:pPr algn="just">
@@ -3787,6 +3797,13 @@
               <a:rPr lang="pt-BR" sz="3200" dirty="0" smtClean="0"/>
               <a:t>: </a:t>
             </a:r>
+            <a:r>
+              <a:rPr lang="pt-BR" sz="3200" dirty="0" smtClean="0">
+                <a:hlinkClick r:id="rId2"/>
+              </a:rPr>
+              <a:t>bastosmaressa63@gmail.com</a:t>
+            </a:r>
+            <a:endParaRPr lang="pt-BR" sz="3200" dirty="0" smtClean="0"/>
           </a:p>
           <a:p>
             <a:pPr algn="just">
@@ -3795,7 +3812,19 @@
               </a:lnSpc>
             </a:pPr>
             <a:r>
-              <a:rPr lang="pt-BR" sz="3200" smtClean="0"/>
+              <a:rPr lang="pt-BR" sz="3200" dirty="0" smtClean="0"/>
+              <a:t>bastosmaressa@Hotmail.com</a:t>
+            </a:r>
+            <a:endParaRPr lang="pt-BR" sz="3200" dirty="0" smtClean="0"/>
+          </a:p>
+          <a:p>
+            <a:pPr algn="just">
+              <a:lnSpc>
+                <a:spcPct val="200000"/>
+              </a:lnSpc>
+            </a:pPr>
+            <a:r>
+              <a:rPr lang="pt-BR" sz="3200" dirty="0" smtClean="0"/>
               <a:t>Foto:</a:t>
             </a:r>
             <a:endParaRPr lang="x-none" sz="3200" dirty="0"/>
@@ -3847,6 +3876,36 @@
           </a:p>
         </p:txBody>
       </p:sp>
+      <p:pic>
+        <p:nvPicPr>
+          <p:cNvPr id="2" name="Imagem 1"/>
+          <p:cNvPicPr>
+            <a:picLocks noChangeAspect="1"/>
+          </p:cNvPicPr>
+          <p:nvPr/>
+        </p:nvPicPr>
+        <p:blipFill>
+          <a:blip r:embed="rId3">
+            <a:extLst>
+              <a:ext uri="{28A0092B-C50C-407E-A947-70E740481C1C}">
+                <a14:useLocalDpi xmlns:a14="http://schemas.microsoft.com/office/drawing/2010/main" val="0"/>
+              </a:ext>
+            </a:extLst>
+          </a:blip>
+          <a:stretch>
+            <a:fillRect/>
+          </a:stretch>
+        </p:blipFill>
+        <p:spPr>
+          <a:xfrm>
+            <a:off x="6498133" y="2427294"/>
+            <a:ext cx="2291893" cy="4080144"/>
+          </a:xfrm>
+          <a:prstGeom prst="rect">
+            <a:avLst/>
+          </a:prstGeom>
+        </p:spPr>
+      </p:pic>
     </p:spTree>
     <p:extLst>
       <p:ext uri="{BB962C8B-B14F-4D97-AF65-F5344CB8AC3E}">

</xml_diff>